<commit_message>
Reframe docs and slides for downstream-driven clean architecture
</commit_message>
<xml_diff>
--- a/slides/ai-driven-development-intent.pptx
+++ b/slides/ai-driven-development-intent.pptx
@@ -3133,12 +3133,12 @@
           <a:lstStyle/>
           <a:p>
             <a:r>
-              <a:t>Input → 設計 → 実装の必然性</a:t>
-            </a:r>
-          </a:p>
-          <a:p>
-            <a:r>
-              <a:t>ToDoモノリスの意図説明</a:t>
+              <a:t>下流（理想実装）からInputを逆算する</a:t>
+            </a:r>
+          </a:p>
+          <a:p>
+            <a:r>
+              <a:t>再現性のための設計</a:t>
             </a:r>
           </a:p>
         </p:txBody>
@@ -3177,7 +3177,7 @@
           <a:lstStyle/>
           <a:p>
             <a:r>
-              <a:t>このリポジトリの意図</a:t>
+              <a:t>ゴール（下流）</a:t>
             </a:r>
           </a:p>
         </p:txBody>
@@ -3199,19 +3199,19 @@
           <a:p>
             <a:pPr/>
             <a:r>
-              <a:t>“なぜその実装が正しいか”を、上流Inputから逆算して示す</a:t>
+              <a:t>クリーンアーキテクチャで統一したい</a:t>
             </a:r>
           </a:p>
           <a:p>
             <a:pPr/>
             <a:r>
-              <a:t>AIが迷わないための“判断基準の鎖”を文書化</a:t>
+              <a:t>誰が実装しても同じ構成/命名/クラス/メソッド</a:t>
             </a:r>
           </a:p>
           <a:p>
             <a:pPr/>
             <a:r>
-              <a:t>モノリス実装の“正しさ”を再現可能にする</a:t>
+              <a:t>AIが迷わない再現性を作る</a:t>
             </a:r>
           </a:p>
         </p:txBody>
@@ -3250,7 +3250,7 @@
           <a:lstStyle/>
           <a:p>
             <a:r>
-              <a:t>上流Input（前提）</a:t>
+              <a:t>逆算の考え方</a:t>
             </a:r>
           </a:p>
         </p:txBody>
@@ -3272,25 +3272,19 @@
           <a:p>
             <a:pPr/>
             <a:r>
-              <a:t>目的: 迅速に価値検証できるToDoアプリ</a:t>
+              <a:t>先に“理想実装”を固定する</a:t>
             </a:r>
           </a:p>
           <a:p>
             <a:pPr/>
             <a:r>
-              <a:t>チーム: 1–3人の小規模</a:t>
+              <a:t>その実装が成立するためのInputを定義する</a:t>
             </a:r>
           </a:p>
           <a:p>
             <a:pPr/>
             <a:r>
-              <a:t>トラフィック: 低〜中、単一リージョン</a:t>
-            </a:r>
-          </a:p>
-          <a:p>
-            <a:pPr/>
-            <a:r>
-              <a:t>制約: 単一アプリ / 単一DB / 低オペレーション</a:t>
+              <a:t>Inputが揃えば実装が自動的に一致する</a:t>
             </a:r>
           </a:p>
         </p:txBody>
@@ -3329,7 +3323,7 @@
           <a:lstStyle/>
           <a:p>
             <a:r>
-              <a:t>なぜこのInputが良いか</a:t>
+              <a:t>理想実装（固定ルール）</a:t>
             </a:r>
           </a:p>
         </p:txBody>
@@ -3351,25 +3345,19 @@
           <a:p>
             <a:pPr/>
             <a:r>
-              <a:t>小規模チーム → 複雑な分散設計はコスト過多</a:t>
+              <a:t>レイヤー固定: Domain / Application / Infrastructure / Interface</a:t>
             </a:r>
           </a:p>
           <a:p>
             <a:pPr/>
             <a:r>
-              <a:t>低〜中規模負荷 → 早期最適化は不要</a:t>
+              <a:t>依存方向: 外 → 内のみ</a:t>
             </a:r>
           </a:p>
           <a:p>
             <a:pPr/>
             <a:r>
-              <a:t>単一リージョン → ネットワーク分断を避けられる</a:t>
-            </a:r>
-          </a:p>
-          <a:p>
-            <a:pPr/>
-            <a:r>
-              <a:t>“速さ優先” → ドキュメント主導の合意形成が効く</a:t>
+              <a:t>モジュール: task / user / auth / notification</a:t>
             </a:r>
           </a:p>
         </p:txBody>
@@ -3408,7 +3396,7 @@
           <a:lstStyle/>
           <a:p>
             <a:r>
-              <a:t>設計判断（Input → Design）</a:t>
+              <a:t>必要Input（逆算）</a:t>
             </a:r>
           </a:p>
         </p:txBody>
@@ -3430,25 +3418,55 @@
           <a:p>
             <a:pPr/>
             <a:r>
-              <a:t>単一DB: 運用負荷を最小化</a:t>
+              <a:t>構成</a:t>
+            </a:r>
+          </a:p>
+          <a:p>
+            <a:pPr lvl="1"/>
+            <a:r>
+              <a:t>ディレクトリ構成を固定</a:t>
+            </a:r>
+          </a:p>
+          <a:p>
+            <a:pPr lvl="1"/>
+            <a:r>
+              <a:t>命名規約を固定</a:t>
             </a:r>
           </a:p>
           <a:p>
             <a:pPr/>
             <a:r>
-              <a:t>モノリス: 変更容易性と開発速度を最大化</a:t>
+              <a:t>責務</a:t>
+            </a:r>
+          </a:p>
+          <a:p>
+            <a:pPr lvl="1"/>
+            <a:r>
+              <a:t>各レイヤーの役割を明文化</a:t>
             </a:r>
           </a:p>
           <a:p>
             <a:pPr/>
             <a:r>
-              <a:t>ジョブは同一プロセス: 追加インフラ不要</a:t>
+              <a:t>依存</a:t>
+            </a:r>
+          </a:p>
+          <a:p>
+            <a:pPr lvl="1"/>
+            <a:r>
+              <a:t>外→内の制約を明文化</a:t>
             </a:r>
           </a:p>
           <a:p>
             <a:pPr/>
             <a:r>
-              <a:t>REST API: CRUDに最適</a:t>
+              <a:t>機能</a:t>
+            </a:r>
+          </a:p>
+          <a:p>
+            <a:pPr lvl="1"/>
+            <a:r>
+              <a:t>User/Task/Notificationの最小要件</a:t>
             </a:r>
           </a:p>
         </p:txBody>
@@ -3487,7 +3505,7 @@
           <a:lstStyle/>
           <a:p>
             <a:r>
-              <a:t>実装指針（Design → Implementation）</a:t>
+              <a:t>Why Clean Architecture</a:t>
             </a:r>
           </a:p>
         </p:txBody>
@@ -3509,37 +3527,19 @@
           <a:p>
             <a:pPr/>
             <a:r>
-              <a:t>モジュール分割</a:t>
-            </a:r>
-          </a:p>
-          <a:p>
-            <a:pPr lvl="1"/>
-            <a:r>
-              <a:t>auth / users / tasks / notifications / shared</a:t>
+              <a:t>依存方向が明確で実装がブレない</a:t>
             </a:r>
           </a:p>
           <a:p>
             <a:pPr/>
             <a:r>
-              <a:t>API</a:t>
-            </a:r>
-          </a:p>
-          <a:p>
-            <a:pPr lvl="1"/>
-            <a:r>
-              <a:t>signup/login, tasks CRUD, users/me</a:t>
+              <a:t>責務が固定されレビューが容易</a:t>
             </a:r>
           </a:p>
           <a:p>
             <a:pPr/>
             <a:r>
-              <a:t>通知</a:t>
-            </a:r>
-          </a:p>
-          <a:p>
-            <a:pPr lvl="1"/>
-            <a:r>
-              <a:t>日次 + 15分スキャンのin-processジョブ</a:t>
+              <a:t>AI生成でも再現性が高い</a:t>
             </a:r>
           </a:p>
         </p:txBody>
@@ -3578,7 +3578,7 @@
           <a:lstStyle/>
           <a:p>
             <a:r>
-              <a:t>なぜこの実装が『実装すべき』か</a:t>
+              <a:t>awesome‑agent‑skills からの学び</a:t>
             </a:r>
           </a:p>
         </p:txBody>
@@ -3600,19 +3600,19 @@
           <a:p>
             <a:pPr/>
             <a:r>
-              <a:t>Inputに対して最短距離で価値を出す</a:t>
+              <a:t>Skill = レシピカード（必要な時だけ読む）</a:t>
             </a:r>
           </a:p>
           <a:p>
             <a:pPr/>
             <a:r>
-              <a:t>変更が多い初期フェーズに最適</a:t>
+              <a:t>指示書があるとAIの行動が標準化される</a:t>
             </a:r>
           </a:p>
           <a:p>
             <a:pPr/>
             <a:r>
-              <a:t>AIが“迷わない”再現性がある</a:t>
+              <a:t>このリポジトリ自体を“Skill”として使える</a:t>
             </a:r>
           </a:p>
         </p:txBody>
@@ -3651,7 +3651,7 @@
           <a:lstStyle/>
           <a:p>
             <a:r>
-              <a:t>このリポジトリの使い方</a:t>
+              <a:t>このリポジトリの役割</a:t>
             </a:r>
           </a:p>
         </p:txBody>
@@ -3673,19 +3673,19 @@
           <a:p>
             <a:pPr/>
             <a:r>
-              <a:t>docs/ai で Input → 要件 → 設計 → 計画を確認</a:t>
+              <a:t>docs/ai がInput→設計→実装計画を提供</a:t>
             </a:r>
           </a:p>
           <a:p>
             <a:pPr/>
             <a:r>
-              <a:t>docs/implementation で実装指針を参照</a:t>
+              <a:t>docs/implementation が最終実装の型を固定</a:t>
             </a:r>
           </a:p>
           <a:p>
             <a:pPr/>
             <a:r>
-              <a:t>src のNode実装は最小の参考コード</a:t>
+              <a:t>src は最小コード例</a:t>
             </a:r>
           </a:p>
         </p:txBody>
@@ -3724,7 +3724,7 @@
           <a:lstStyle/>
           <a:p>
             <a:r>
-              <a:t>将来の分岐（参考）</a:t>
+              <a:t>結論</a:t>
             </a:r>
           </a:p>
         </p:txBody>
@@ -3746,19 +3746,19 @@
           <a:p>
             <a:pPr/>
             <a:r>
-              <a:t>負荷/変更頻度が局所的に増大したら分割を検討</a:t>
+              <a:t>下流（理想実装）を固定 → 必要Inputを逆算</a:t>
             </a:r>
           </a:p>
           <a:p>
             <a:pPr/>
             <a:r>
-              <a:t>最初に切り出し候補: notifications</a:t>
+              <a:t>同じInputなら同じ実装になる</a:t>
             </a:r>
           </a:p>
           <a:p>
             <a:pPr/>
             <a:r>
-              <a:t>それでもまずはモノリスで十分</a:t>
+              <a:t>再現性が“品質”を保証する</a:t>
             </a:r>
           </a:p>
         </p:txBody>

</xml_diff>